<commit_message>
by observing the distribution and the R, instead of setting to NA the values as they will be removed from the robusntess calculation, I set the mumax of the strains that did not grow to 0 and the remaining mumax with r2 < 0.99 to NA
</commit_message>
<xml_diff>
--- a/plots/LHPS_fitness/figure_2_final.pptx
+++ b/plots/LHPS_fitness/figure_2_final.pptx
@@ -125,16 +125,24 @@
   <pc:docChgLst>
     <pc:chgData name="Cecilia Trivellin" userId="77962b75-de7c-4c40-bb6b-4b915835e2f5" providerId="ADAL" clId="{D67BC173-D5D4-AA4A-B717-345452F0C4F7}"/>
     <pc:docChg chg="modSld">
-      <pc:chgData name="Cecilia Trivellin" userId="77962b75-de7c-4c40-bb6b-4b915835e2f5" providerId="ADAL" clId="{D67BC173-D5D4-AA4A-B717-345452F0C4F7}" dt="2023-08-24T19:39:47.309" v="21" actId="1038"/>
+      <pc:chgData name="Cecilia Trivellin" userId="77962b75-de7c-4c40-bb6b-4b915835e2f5" providerId="ADAL" clId="{D67BC173-D5D4-AA4A-B717-345452F0C4F7}" dt="2023-08-24T19:43:29.668" v="29" actId="14100"/>
       <pc:docMkLst>
         <pc:docMk/>
       </pc:docMkLst>
       <pc:sldChg chg="modSp mod">
-        <pc:chgData name="Cecilia Trivellin" userId="77962b75-de7c-4c40-bb6b-4b915835e2f5" providerId="ADAL" clId="{D67BC173-D5D4-AA4A-B717-345452F0C4F7}" dt="2023-08-24T19:39:47.309" v="21" actId="1038"/>
+        <pc:chgData name="Cecilia Trivellin" userId="77962b75-de7c-4c40-bb6b-4b915835e2f5" providerId="ADAL" clId="{D67BC173-D5D4-AA4A-B717-345452F0C4F7}" dt="2023-08-24T19:43:29.668" v="29" actId="14100"/>
         <pc:sldMkLst>
           <pc:docMk/>
           <pc:sldMk cId="1624886000" sldId="256"/>
         </pc:sldMkLst>
+        <pc:spChg chg="mod">
+          <ac:chgData name="Cecilia Trivellin" userId="77962b75-de7c-4c40-bb6b-4b915835e2f5" providerId="ADAL" clId="{D67BC173-D5D4-AA4A-B717-345452F0C4F7}" dt="2023-08-24T19:43:29.668" v="29" actId="14100"/>
+          <ac:spMkLst>
+            <pc:docMk/>
+            <pc:sldMk cId="1624886000" sldId="256"/>
+            <ac:spMk id="23" creationId="{55C96A3D-FBC5-F10B-3AA7-4D5A897E4A32}"/>
+          </ac:spMkLst>
+        </pc:spChg>
         <pc:picChg chg="mod">
           <ac:chgData name="Cecilia Trivellin" userId="77962b75-de7c-4c40-bb6b-4b915835e2f5" providerId="ADAL" clId="{D67BC173-D5D4-AA4A-B717-345452F0C4F7}" dt="2023-08-24T19:39:47.309" v="21" actId="1038"/>
           <ac:picMkLst>
@@ -3555,7 +3563,7 @@
         <p:spPr>
           <a:xfrm>
             <a:off x="618350" y="113071"/>
-            <a:ext cx="5807176" cy="307777"/>
+            <a:ext cx="6626900" cy="307777"/>
           </a:xfrm>
           <a:prstGeom prst="rect">
             <a:avLst/>
@@ -3573,7 +3581,7 @@
                 <a:latin typeface="Arial" panose="020B0604020202020204" pitchFamily="34" charset="0"/>
                 <a:cs typeface="Arial" panose="020B0604020202020204" pitchFamily="34" charset="0"/>
               </a:rPr>
-              <a:t>PERTUBATION SPACE: Lignocellulose hydrolysates fermentation</a:t>
+              <a:t>PERTUBATION SPACE: Lignocellulose hydrolysates fermentation (LHPS)</a:t>
             </a:r>
           </a:p>
         </p:txBody>

</xml_diff>